<commit_message>
added homework for week 3
</commit_message>
<xml_diff>
--- a/week3/week 3 - wednesday.pptx
+++ b/week3/week 3 - wednesday.pptx
@@ -3201,6 +3201,13 @@
   <p:clrMapOvr>
     <a:masterClrMapping/>
   </p:clrMapOvr>
+  <p:timing>
+    <p:tnLst>
+      <p:par>
+        <p:cTn xmlns:p14="http://schemas.microsoft.com/office/powerpoint/2010/main" id="1" dur="indefinite" restart="never" nodeType="tmRoot"/>
+      </p:par>
+    </p:tnLst>
+  </p:timing>
 </p:sld>
 </file>
 
@@ -3303,6 +3310,13 @@
   <p:clrMapOvr>
     <a:masterClrMapping/>
   </p:clrMapOvr>
+  <p:timing>
+    <p:tnLst>
+      <p:par>
+        <p:cTn xmlns:p14="http://schemas.microsoft.com/office/powerpoint/2010/main" id="1" dur="indefinite" restart="never" nodeType="tmRoot"/>
+      </p:par>
+    </p:tnLst>
+  </p:timing>
 </p:sld>
 </file>
 
@@ -3405,6 +3419,13 @@
   <p:clrMapOvr>
     <a:masterClrMapping/>
   </p:clrMapOvr>
+  <p:timing>
+    <p:tnLst>
+      <p:par>
+        <p:cTn xmlns:p14="http://schemas.microsoft.com/office/powerpoint/2010/main" id="1" dur="indefinite" restart="never" nodeType="tmRoot"/>
+      </p:par>
+    </p:tnLst>
+  </p:timing>
 </p:sld>
 </file>
 
@@ -3481,6 +3502,13 @@
   <p:clrMapOvr>
     <a:masterClrMapping/>
   </p:clrMapOvr>
+  <p:timing>
+    <p:tnLst>
+      <p:par>
+        <p:cTn xmlns:p14="http://schemas.microsoft.com/office/powerpoint/2010/main" id="1" dur="indefinite" restart="never" nodeType="tmRoot"/>
+      </p:par>
+    </p:tnLst>
+  </p:timing>
 </p:sld>
 </file>
 
@@ -3615,6 +3643,13 @@
   <p:clrMapOvr>
     <a:masterClrMapping/>
   </p:clrMapOvr>
+  <p:timing>
+    <p:tnLst>
+      <p:par>
+        <p:cTn xmlns:p14="http://schemas.microsoft.com/office/powerpoint/2010/main" id="1" dur="indefinite" restart="never" nodeType="tmRoot"/>
+      </p:par>
+    </p:tnLst>
+  </p:timing>
 </p:sld>
 </file>
 
@@ -3709,6 +3744,13 @@
   <p:clrMapOvr>
     <a:masterClrMapping/>
   </p:clrMapOvr>
+  <p:timing>
+    <p:tnLst>
+      <p:par>
+        <p:cTn xmlns:p14="http://schemas.microsoft.com/office/powerpoint/2010/main" id="1" dur="indefinite" restart="never" nodeType="tmRoot"/>
+      </p:par>
+    </p:tnLst>
+  </p:timing>
 </p:sld>
 </file>
 
@@ -3785,6 +3827,13 @@
   <p:clrMapOvr>
     <a:masterClrMapping/>
   </p:clrMapOvr>
+  <p:timing>
+    <p:tnLst>
+      <p:par>
+        <p:cTn xmlns:p14="http://schemas.microsoft.com/office/powerpoint/2010/main" id="1" dur="indefinite" restart="never" nodeType="tmRoot"/>
+      </p:par>
+    </p:tnLst>
+  </p:timing>
 </p:sld>
 </file>
 
@@ -3858,6 +3907,13 @@
   <p:clrMapOvr>
     <a:masterClrMapping/>
   </p:clrMapOvr>
+  <p:timing>
+    <p:tnLst>
+      <p:par>
+        <p:cTn xmlns:p14="http://schemas.microsoft.com/office/powerpoint/2010/main" id="1" dur="indefinite" restart="never" nodeType="tmRoot"/>
+      </p:par>
+    </p:tnLst>
+  </p:timing>
 </p:sld>
 </file>
 
@@ -3966,6 +4022,13 @@
   <p:clrMapOvr>
     <a:masterClrMapping/>
   </p:clrMapOvr>
+  <p:timing>
+    <p:tnLst>
+      <p:par>
+        <p:cTn xmlns:p14="http://schemas.microsoft.com/office/powerpoint/2010/main" id="1" dur="indefinite" restart="never" nodeType="tmRoot"/>
+      </p:par>
+    </p:tnLst>
+  </p:timing>
 </p:sld>
 </file>
 
@@ -4039,6 +4102,13 @@
   <p:clrMapOvr>
     <a:masterClrMapping/>
   </p:clrMapOvr>
+  <p:timing>
+    <p:tnLst>
+      <p:par>
+        <p:cTn xmlns:p14="http://schemas.microsoft.com/office/powerpoint/2010/main" id="1" dur="indefinite" restart="never" nodeType="tmRoot"/>
+      </p:par>
+    </p:tnLst>
+  </p:timing>
 </p:sld>
 </file>
 
@@ -4142,6 +4212,13 @@
   <p:clrMapOvr>
     <a:masterClrMapping/>
   </p:clrMapOvr>
+  <p:timing>
+    <p:tnLst>
+      <p:par>
+        <p:cTn xmlns:p14="http://schemas.microsoft.com/office/powerpoint/2010/main" id="1" dur="indefinite" restart="never" nodeType="tmRoot"/>
+      </p:par>
+    </p:tnLst>
+  </p:timing>
 </p:sld>
 </file>
 
@@ -4238,6 +4315,13 @@
   <p:clrMapOvr>
     <a:masterClrMapping/>
   </p:clrMapOvr>
+  <p:timing>
+    <p:tnLst>
+      <p:par>
+        <p:cTn xmlns:p14="http://schemas.microsoft.com/office/powerpoint/2010/main" id="1" dur="indefinite" restart="never" nodeType="tmRoot"/>
+      </p:par>
+    </p:tnLst>
+  </p:timing>
 </p:sld>
 </file>
 
@@ -4311,6 +4395,13 @@
   <p:clrMapOvr>
     <a:masterClrMapping/>
   </p:clrMapOvr>
+  <p:timing>
+    <p:tnLst>
+      <p:par>
+        <p:cTn xmlns:p14="http://schemas.microsoft.com/office/powerpoint/2010/main" id="1" dur="indefinite" restart="never" nodeType="tmRoot"/>
+      </p:par>
+    </p:tnLst>
+  </p:timing>
 </p:sld>
 </file>
 
@@ -4401,6 +4492,13 @@
   <p:clrMapOvr>
     <a:masterClrMapping/>
   </p:clrMapOvr>
+  <p:timing>
+    <p:tnLst>
+      <p:par>
+        <p:cTn xmlns:p14="http://schemas.microsoft.com/office/powerpoint/2010/main" id="1" dur="indefinite" restart="never" nodeType="tmRoot"/>
+      </p:par>
+    </p:tnLst>
+  </p:timing>
 </p:sld>
 </file>
 
@@ -4474,6 +4572,13 @@
   <p:clrMapOvr>
     <a:masterClrMapping/>
   </p:clrMapOvr>
+  <p:timing>
+    <p:tnLst>
+      <p:par>
+        <p:cTn xmlns:p14="http://schemas.microsoft.com/office/powerpoint/2010/main" id="1" dur="indefinite" restart="never" nodeType="tmRoot"/>
+      </p:par>
+    </p:tnLst>
+  </p:timing>
 </p:sld>
 </file>
 
@@ -4552,6 +4657,13 @@
   <p:clrMapOvr>
     <a:masterClrMapping/>
   </p:clrMapOvr>
+  <p:timing>
+    <p:tnLst>
+      <p:par>
+        <p:cTn xmlns:p14="http://schemas.microsoft.com/office/powerpoint/2010/main" id="1" dur="indefinite" restart="never" nodeType="tmRoot"/>
+      </p:par>
+    </p:tnLst>
+  </p:timing>
 </p:sld>
 </file>
 
@@ -4625,6 +4737,13 @@
   <p:clrMapOvr>
     <a:masterClrMapping/>
   </p:clrMapOvr>
+  <p:timing>
+    <p:tnLst>
+      <p:par>
+        <p:cTn xmlns:p14="http://schemas.microsoft.com/office/powerpoint/2010/main" id="1" dur="indefinite" restart="never" nodeType="tmRoot"/>
+      </p:par>
+    </p:tnLst>
+  </p:timing>
 </p:sld>
 </file>
 
@@ -4705,6 +4824,13 @@
   <p:clrMapOvr>
     <a:masterClrMapping/>
   </p:clrMapOvr>
+  <p:timing>
+    <p:tnLst>
+      <p:par>
+        <p:cTn xmlns:p14="http://schemas.microsoft.com/office/powerpoint/2010/main" id="1" dur="indefinite" restart="never" nodeType="tmRoot"/>
+      </p:par>
+    </p:tnLst>
+  </p:timing>
 </p:sld>
 </file>
 
@@ -4778,6 +4904,13 @@
   <p:clrMapOvr>
     <a:masterClrMapping/>
   </p:clrMapOvr>
+  <p:timing>
+    <p:tnLst>
+      <p:par>
+        <p:cTn xmlns:p14="http://schemas.microsoft.com/office/powerpoint/2010/main" id="1" dur="indefinite" restart="never" nodeType="tmRoot"/>
+      </p:par>
+    </p:tnLst>
+  </p:timing>
 </p:sld>
 </file>
 
@@ -4854,6 +4987,13 @@
   <p:clrMapOvr>
     <a:masterClrMapping/>
   </p:clrMapOvr>
+  <p:timing>
+    <p:tnLst>
+      <p:par>
+        <p:cTn xmlns:p14="http://schemas.microsoft.com/office/powerpoint/2010/main" id="1" dur="indefinite" restart="never" nodeType="tmRoot"/>
+      </p:par>
+    </p:tnLst>
+  </p:timing>
 </p:sld>
 </file>
 
@@ -4991,6 +5131,13 @@
   <p:clrMapOvr>
     <a:masterClrMapping/>
   </p:clrMapOvr>
+  <p:timing>
+    <p:tnLst>
+      <p:par>
+        <p:cTn xmlns:p14="http://schemas.microsoft.com/office/powerpoint/2010/main" id="1" dur="indefinite" restart="never" nodeType="tmRoot"/>
+      </p:par>
+    </p:tnLst>
+  </p:timing>
 </p:sld>
 </file>
 
@@ -5081,6 +5228,13 @@
   <p:clrMapOvr>
     <a:masterClrMapping/>
   </p:clrMapOvr>
+  <p:timing>
+    <p:tnLst>
+      <p:par>
+        <p:cTn xmlns:p14="http://schemas.microsoft.com/office/powerpoint/2010/main" id="1" dur="indefinite" restart="never" nodeType="tmRoot"/>
+      </p:par>
+    </p:tnLst>
+  </p:timing>
 </p:sld>
 </file>
 
@@ -5154,6 +5308,13 @@
   <p:clrMapOvr>
     <a:masterClrMapping/>
   </p:clrMapOvr>
+  <p:timing>
+    <p:tnLst>
+      <p:par>
+        <p:cTn xmlns:p14="http://schemas.microsoft.com/office/powerpoint/2010/main" id="1" dur="indefinite" restart="never" nodeType="tmRoot"/>
+      </p:par>
+    </p:tnLst>
+  </p:timing>
 </p:sld>
 </file>
 
@@ -5227,6 +5388,13 @@
   <p:clrMapOvr>
     <a:masterClrMapping/>
   </p:clrMapOvr>
+  <p:timing>
+    <p:tnLst>
+      <p:par>
+        <p:cTn xmlns:p14="http://schemas.microsoft.com/office/powerpoint/2010/main" id="1" dur="indefinite" restart="never" nodeType="tmRoot"/>
+      </p:par>
+    </p:tnLst>
+  </p:timing>
 </p:sld>
 </file>
 
@@ -5300,6 +5468,13 @@
   <p:clrMapOvr>
     <a:masterClrMapping/>
   </p:clrMapOvr>
+  <p:timing>
+    <p:tnLst>
+      <p:par>
+        <p:cTn xmlns:p14="http://schemas.microsoft.com/office/powerpoint/2010/main" id="1" dur="indefinite" restart="never" nodeType="tmRoot"/>
+      </p:par>
+    </p:tnLst>
+  </p:timing>
 </p:sld>
 </file>
 
@@ -5373,6 +5548,13 @@
   <p:clrMapOvr>
     <a:masterClrMapping/>
   </p:clrMapOvr>
+  <p:timing>
+    <p:tnLst>
+      <p:par>
+        <p:cTn xmlns:p14="http://schemas.microsoft.com/office/powerpoint/2010/main" id="1" dur="indefinite" restart="never" nodeType="tmRoot"/>
+      </p:par>
+    </p:tnLst>
+  </p:timing>
 </p:sld>
 </file>
 
@@ -5524,6 +5706,13 @@
   <p:clrMapOvr>
     <a:masterClrMapping/>
   </p:clrMapOvr>
+  <p:timing>
+    <p:tnLst>
+      <p:par>
+        <p:cTn xmlns:p14="http://schemas.microsoft.com/office/powerpoint/2010/main" id="1" dur="indefinite" restart="never" nodeType="tmRoot"/>
+      </p:par>
+    </p:tnLst>
+  </p:timing>
 </p:sld>
 </file>
 

</xml_diff>